<commit_message>
show media, add shapes with bad location and get url
</commit_message>
<xml_diff>
--- a/output/Leadership Module DM2 - Living Out Core Values.pptx
+++ b/output/Leadership Module DM2 - Living Out Core Values.pptx
@@ -7606,7 +7606,7 @@
         </p:nvSpPr>
         <p:spPr>
           <a:xfrm>
-            <a:off x="7264814" y="3468844"/>
+            <a:off x="2122536" y="408910"/>
             <a:ext cx="3000000" cy="1000000"/>
           </a:xfrm>
           <a:prstGeom prst="rect">
@@ -8252,7 +8252,7 @@
         </p:nvSpPr>
         <p:spPr>
           <a:xfrm>
-            <a:off x="3606858" y="1847591"/>
+            <a:off x="6089706" y="2094609"/>
             <a:ext cx="3000000" cy="1000000"/>
           </a:xfrm>
           <a:prstGeom prst="rect">

</xml_diff>

<commit_message>
add shape to the right location
</commit_message>
<xml_diff>
--- a/output/Leadership Module DM2 - Living Out Core Values.pptx
+++ b/output/Leadership Module DM2 - Living Out Core Values.pptx
@@ -7606,8 +7606,8 @@
         </p:nvSpPr>
         <p:spPr>
           <a:xfrm>
-            <a:off x="2122536" y="408910"/>
-            <a:ext cx="3000000" cy="1000000"/>
+            <a:off x="4216997" y="1509688"/>
+            <a:ext cx="7826393" cy="4418456"/>
           </a:xfrm>
           <a:prstGeom prst="rect">
             <a:avLst/>
@@ -8252,8 +8252,8 @@
         </p:nvSpPr>
         <p:spPr>
           <a:xfrm>
-            <a:off x="6089706" y="2094609"/>
-            <a:ext cx="3000000" cy="1000000"/>
+            <a:off x="5124686" y="1454727"/>
+            <a:ext cx="6994044" cy="3948545"/>
           </a:xfrm>
           <a:prstGeom prst="rect">
             <a:avLst/>

</xml_diff>

<commit_message>
good state, trasnparent box
</commit_message>
<xml_diff>
--- a/output/Leadership Module DM2 - Living Out Core Values.pptx
+++ b/output/Leadership Module DM2 - Living Out Core Values.pptx
@@ -7612,9 +7612,7 @@
           <a:prstGeom prst="rect">
             <a:avLst/>
           </a:prstGeom>
-          <a:solidFill>
-            <a:srgbClr val="FF0000"/>
-          </a:solidFill>
+          <a:noFill/>
         </p:spPr>
         <p:style>
           <a:lnRef idx="1">
@@ -8258,9 +8256,7 @@
           <a:prstGeom prst="rect">
             <a:avLst/>
           </a:prstGeom>
-          <a:solidFill>
-            <a:srgbClr val="FF0000"/>
-          </a:solidFill>
+          <a:noFill/>
         </p:spPr>
         <p:style>
           <a:lnRef idx="1">

</xml_diff>